<commit_message>
add song_editor - update title font size
</commit_message>
<xml_diff>
--- a/template/template_1.pptx
+++ b/template/template_1.pptx
@@ -3411,7 +3411,7 @@
           <a:lstStyle/>
           <a:p>
             <a:r>
-              <a:rPr lang="en-US" sz="2400" b="1" dirty="0">
+              <a:rPr lang="en-US" sz="2800" b="1" dirty="0">
                 <a:solidFill>
                   <a:schemeClr val="accent4"/>
                 </a:solidFill>
@@ -3460,7 +3460,7 @@
               </a:rPr>
             </a:br>
             <a:r>
-              <a:rPr lang="en-US" sz="4400" b="1" dirty="0">
+              <a:rPr lang="en-US" sz="4800" b="1" dirty="0">
                 <a:solidFill>
                   <a:schemeClr val="accent4"/>
                 </a:solidFill>

</xml_diff>